<commit_message>
Renamed proj1 lab and added lab5
</commit_message>
<xml_diff>
--- a/data8/slides/sp20_lab5.pptx
+++ b/data8/slides/sp20_lab5.pptx
@@ -9,17 +9,15 @@
     <p:sldMasterId id="2147483699" r:id="rId5"/>
   </p:sldMasterIdLst>
   <p:notesMasterIdLst>
-    <p:notesMasterId r:id="rId11"/>
+    <p:notesMasterId r:id="rId9"/>
   </p:notesMasterIdLst>
   <p:handoutMasterIdLst>
-    <p:handoutMasterId r:id="rId12"/>
+    <p:handoutMasterId r:id="rId10"/>
   </p:handoutMasterIdLst>
   <p:sldIdLst>
     <p:sldId id="256" r:id="rId6"/>
-    <p:sldId id="278" r:id="rId7"/>
-    <p:sldId id="280" r:id="rId8"/>
-    <p:sldId id="279" r:id="rId9"/>
-    <p:sldId id="267" r:id="rId10"/>
+    <p:sldId id="267" r:id="rId7"/>
+    <p:sldId id="268" r:id="rId8"/>
   </p:sldIdLst>
   <p:sldSz cx="9144000" cy="6858000" type="screen4x3"/>
   <p:notesSz cx="6858000" cy="9144000"/>
@@ -203,7 +201,7 @@
           <a:p>
             <a:fld id="{97CB1905-1EEB-6545-B5E2-B70E8868255E}" type="datetimeFigureOut">
               <a:rPr lang="en-US" smtClean="0"/>
-              <a:t>2/21/2020</a:t>
+              <a:t>2/28/2020</a:t>
             </a:fld>
             <a:endParaRPr lang="en-US"/>
           </a:p>
@@ -369,7 +367,7 @@
           <a:p>
             <a:fld id="{5F53F6BF-7462-9046-A2B6-90C29244BD27}" type="datetimeFigureOut">
               <a:rPr lang="en-US" smtClean="0"/>
-              <a:t>2/21/2020</a:t>
+              <a:t>2/28/2020</a:t>
             </a:fld>
             <a:endParaRPr lang="en-US"/>
           </a:p>
@@ -638,6 +636,90 @@
 </p:notesMaster>
 </file>
 
+<file path=ppt/notesSlides/notesSlide1.xml><?xml version="1.0" encoding="utf-8"?>
+<p:notes xmlns:a="http://schemas.openxmlformats.org/drawingml/2006/main" xmlns:r="http://schemas.openxmlformats.org/officeDocument/2006/relationships" xmlns:p="http://schemas.openxmlformats.org/presentationml/2006/main">
+  <p:cSld>
+    <p:spTree>
+      <p:nvGrpSpPr>
+        <p:cNvPr id="1" name=""/>
+        <p:cNvGrpSpPr/>
+        <p:nvPr/>
+      </p:nvGrpSpPr>
+      <p:grpSpPr>
+        <a:xfrm>
+          <a:off x="0" y="0"/>
+          <a:ext cx="0" cy="0"/>
+          <a:chOff x="0" y="0"/>
+          <a:chExt cx="0" cy="0"/>
+        </a:xfrm>
+      </p:grpSpPr>
+      <p:sp>
+        <p:nvSpPr>
+          <p:cNvPr id="2" name="Slide Image Placeholder 1"/>
+          <p:cNvSpPr>
+            <a:spLocks noGrp="1" noRot="1" noChangeAspect="1"/>
+          </p:cNvSpPr>
+          <p:nvPr>
+            <p:ph type="sldImg"/>
+          </p:nvPr>
+        </p:nvSpPr>
+        <p:spPr/>
+      </p:sp>
+      <p:sp>
+        <p:nvSpPr>
+          <p:cNvPr id="3" name="Notes Placeholder 2"/>
+          <p:cNvSpPr>
+            <a:spLocks noGrp="1"/>
+          </p:cNvSpPr>
+          <p:nvPr>
+            <p:ph type="body" idx="1"/>
+          </p:nvPr>
+        </p:nvSpPr>
+        <p:spPr/>
+        <p:txBody>
+          <a:bodyPr/>
+          <a:lstStyle/>
+          <a:p>
+            <a:endParaRPr lang="en-CA" dirty="0"/>
+          </a:p>
+        </p:txBody>
+      </p:sp>
+      <p:sp>
+        <p:nvSpPr>
+          <p:cNvPr id="4" name="Slide Number Placeholder 3"/>
+          <p:cNvSpPr>
+            <a:spLocks noGrp="1"/>
+          </p:cNvSpPr>
+          <p:nvPr>
+            <p:ph type="sldNum" sz="quarter" idx="10"/>
+          </p:nvPr>
+        </p:nvSpPr>
+        <p:spPr/>
+        <p:txBody>
+          <a:bodyPr/>
+          <a:lstStyle/>
+          <a:p>
+            <a:fld id="{84B7DBC5-2A13-CA47-B9EE-6017A92B6B18}" type="slidenum">
+              <a:rPr lang="en-US" smtClean="0"/>
+              <a:t>1</a:t>
+            </a:fld>
+            <a:endParaRPr lang="en-US"/>
+          </a:p>
+        </p:txBody>
+      </p:sp>
+    </p:spTree>
+    <p:extLst>
+      <p:ext uri="{BB962C8B-B14F-4D97-AF65-F5344CB8AC3E}">
+        <p14:creationId xmlns:p14="http://schemas.microsoft.com/office/powerpoint/2010/main" val="3724463137"/>
+      </p:ext>
+    </p:extLst>
+  </p:cSld>
+  <p:clrMapOvr>
+    <a:masterClrMapping/>
+  </p:clrMapOvr>
+</p:notes>
+</file>
+
 <file path=ppt/slideLayouts/slideLayout1.xml><?xml version="1.0" encoding="utf-8"?>
 <p:sldLayout xmlns:a="http://schemas.openxmlformats.org/drawingml/2006/main" xmlns:r="http://schemas.openxmlformats.org/officeDocument/2006/relationships" xmlns:p="http://schemas.openxmlformats.org/presentationml/2006/main" type="title" preserve="1">
   <p:cSld name="Title Slide">
@@ -7656,10 +7738,7 @@
               <a:t>Data 8, Lab </a:t>
             </a:r>
             <a:r>
-              <a:rPr lang="en-US" dirty="0" smtClean="0">
-                <a:solidFill>
-                  <a:srgbClr val="C28220"/>
-                </a:solidFill>
+              <a:rPr lang="en-US" dirty="0">
                 <a:latin typeface="Avenir LT Std 45 Book" pitchFamily="34" charset="0"/>
               </a:rPr>
               <a:t>5</a:t>
@@ -7699,11 +7778,8 @@
               <a:rPr lang="en-US" b="1" dirty="0" smtClean="0">
                 <a:latin typeface="Avenir LT Std 45 Book" pitchFamily="34" charset="0"/>
               </a:rPr>
-              <a:t>Groups, Joins, and Pivots</a:t>
-            </a:r>
-            <a:endParaRPr lang="en-US" b="1" dirty="0" smtClean="0">
-              <a:latin typeface="Avenir LT Std 45 Book" pitchFamily="34" charset="0"/>
-            </a:endParaRPr>
+              <a:t>Iteration and Conditionals</a:t>
+            </a:r>
           </a:p>
           <a:p>
             <a:endParaRPr lang="en-US" b="1" dirty="0">
@@ -7736,19 +7812,7 @@
               <a:rPr lang="en-US" dirty="0" smtClean="0">
                 <a:latin typeface="Avenir LT Std 45 Book" pitchFamily="34" charset="0"/>
               </a:rPr>
-              <a:t>21</a:t>
-            </a:r>
-            <a:r>
-              <a:rPr lang="en-US" dirty="0" smtClean="0">
-                <a:latin typeface="Avenir LT Std 45 Book" pitchFamily="34" charset="0"/>
-              </a:rPr>
-              <a:t> </a:t>
-            </a:r>
-            <a:r>
-              <a:rPr lang="en-US" dirty="0" smtClean="0">
-                <a:latin typeface="Avenir LT Std 45 Book" pitchFamily="34" charset="0"/>
-              </a:rPr>
-              <a:t>February 2020</a:t>
+              <a:t>28 February 2020</a:t>
             </a:r>
           </a:p>
           <a:p>
@@ -7812,6 +7876,38 @@
           </a:xfrm>
         </p:spPr>
         <p:txBody>
+          <a:bodyPr/>
+          <a:lstStyle/>
+          <a:p>
+            <a:r>
+              <a:rPr lang="en-CA" dirty="0" smtClean="0">
+                <a:latin typeface="+mn-lt"/>
+              </a:rPr>
+              <a:t>Return Statements</a:t>
+            </a:r>
+            <a:endParaRPr lang="en-CA" dirty="0">
+              <a:latin typeface="+mn-lt"/>
+            </a:endParaRPr>
+          </a:p>
+        </p:txBody>
+      </p:sp>
+      <p:sp>
+        <p:nvSpPr>
+          <p:cNvPr id="3" name="Content Placeholder 2"/>
+          <p:cNvSpPr>
+            <a:spLocks noGrp="1"/>
+          </p:cNvSpPr>
+          <p:nvPr>
+            <p:ph idx="1"/>
+          </p:nvPr>
+        </p:nvSpPr>
+        <p:spPr>
+          <a:xfrm>
+            <a:off x="457200" y="1756947"/>
+            <a:ext cx="8286750" cy="3596103"/>
+          </a:xfrm>
+        </p:spPr>
+        <p:txBody>
           <a:bodyPr>
             <a:normAutofit/>
           </a:bodyPr>
@@ -7821,333 +7917,40 @@
               <a:rPr lang="en-CA" dirty="0" smtClean="0">
                 <a:latin typeface="+mn-lt"/>
               </a:rPr>
-              <a:t>Groups</a:t>
+              <a:t>Can only be used inside a function</a:t>
+            </a:r>
+          </a:p>
+          <a:p>
+            <a:r>
+              <a:rPr lang="en-CA" dirty="0" smtClean="0">
+                <a:latin typeface="+mn-lt"/>
+              </a:rPr>
+              <a:t>After Python executes the return statement, Python will exit the function</a:t>
+            </a:r>
+          </a:p>
+          <a:p>
+            <a:r>
+              <a:rPr lang="en-CA" dirty="0" smtClean="0">
+                <a:latin typeface="+mn-lt"/>
+              </a:rPr>
+              <a:t>Can have multiple return statements in the same function, but only some will </a:t>
+            </a:r>
+            <a:r>
+              <a:rPr lang="en-CA" smtClean="0">
+                <a:latin typeface="+mn-lt"/>
+              </a:rPr>
+              <a:t>be actually used</a:t>
             </a:r>
             <a:endParaRPr lang="en-CA" dirty="0">
               <a:latin typeface="+mn-lt"/>
             </a:endParaRPr>
-          </a:p>
-        </p:txBody>
-      </p:sp>
-      <p:graphicFrame>
-        <p:nvGraphicFramePr>
-          <p:cNvPr id="5" name="Content Placeholder 4"/>
-          <p:cNvGraphicFramePr>
-            <a:graphicFrameLocks noGrp="1"/>
-          </p:cNvGraphicFramePr>
-          <p:nvPr>
-            <p:ph idx="1"/>
-            <p:extLst>
-              <p:ext uri="{D42A27DB-BD31-4B8C-83A1-F6EECF244321}">
-                <p14:modId xmlns:p14="http://schemas.microsoft.com/office/powerpoint/2010/main" val="513992580"/>
-              </p:ext>
-            </p:extLst>
-          </p:nvPr>
-        </p:nvGraphicFramePr>
-        <p:xfrm>
-          <a:off x="457200" y="1757363"/>
-          <a:ext cx="8286750" cy="2595880"/>
-        </p:xfrm>
-        <a:graphic>
-          <a:graphicData uri="http://schemas.openxmlformats.org/drawingml/2006/table">
-            <a:tbl>
-              <a:tblPr firstRow="1" bandRow="1">
-                <a:tableStyleId>{5C22544A-7EE6-4342-B048-85BDC9FD1C3A}</a:tableStyleId>
-              </a:tblPr>
-              <a:tblGrid>
-                <a:gridCol w="4143375"/>
-                <a:gridCol w="4143375"/>
-              </a:tblGrid>
-              <a:tr h="370840">
-                <a:tc>
-                  <a:txBody>
-                    <a:bodyPr/>
-                    <a:lstStyle/>
-                    <a:p>
-                      <a:pPr algn="ctr"/>
-                      <a:r>
-                        <a:rPr lang="en-CA" dirty="0" smtClean="0"/>
-                        <a:t>Flavour</a:t>
-                      </a:r>
-                      <a:endParaRPr lang="en-CA" dirty="0"/>
-                    </a:p>
-                  </a:txBody>
-                  <a:tcPr/>
-                </a:tc>
-                <a:tc>
-                  <a:txBody>
-                    <a:bodyPr/>
-                    <a:lstStyle/>
-                    <a:p>
-                      <a:pPr algn="ctr"/>
-                      <a:r>
-                        <a:rPr lang="en-CA" dirty="0" smtClean="0"/>
-                        <a:t>Colour</a:t>
-                      </a:r>
-                      <a:endParaRPr lang="en-CA" dirty="0"/>
-                    </a:p>
-                  </a:txBody>
-                  <a:tcPr/>
-                </a:tc>
-              </a:tr>
-              <a:tr h="370840">
-                <a:tc>
-                  <a:txBody>
-                    <a:bodyPr/>
-                    <a:lstStyle/>
-                    <a:p>
-                      <a:pPr algn="ctr"/>
-                      <a:r>
-                        <a:rPr lang="en-CA" dirty="0" smtClean="0"/>
-                        <a:t>strawberry</a:t>
-                      </a:r>
-                      <a:endParaRPr lang="en-CA" dirty="0"/>
-                    </a:p>
-                  </a:txBody>
-                  <a:tcPr/>
-                </a:tc>
-                <a:tc>
-                  <a:txBody>
-                    <a:bodyPr/>
-                    <a:lstStyle/>
-                    <a:p>
-                      <a:pPr algn="ctr"/>
-                      <a:r>
-                        <a:rPr lang="en-CA" dirty="0" smtClean="0"/>
-                        <a:t>pink</a:t>
-                      </a:r>
-                      <a:endParaRPr lang="en-CA" dirty="0"/>
-                    </a:p>
-                  </a:txBody>
-                  <a:tcPr/>
-                </a:tc>
-              </a:tr>
-              <a:tr h="370840">
-                <a:tc>
-                  <a:txBody>
-                    <a:bodyPr/>
-                    <a:lstStyle/>
-                    <a:p>
-                      <a:pPr algn="ctr"/>
-                      <a:r>
-                        <a:rPr lang="en-CA" dirty="0" smtClean="0"/>
-                        <a:t>chocolate</a:t>
-                      </a:r>
-                      <a:endParaRPr lang="en-CA" dirty="0"/>
-                    </a:p>
-                  </a:txBody>
-                  <a:tcPr/>
-                </a:tc>
-                <a:tc>
-                  <a:txBody>
-                    <a:bodyPr/>
-                    <a:lstStyle/>
-                    <a:p>
-                      <a:pPr algn="ctr"/>
-                      <a:r>
-                        <a:rPr lang="en-CA" dirty="0" smtClean="0"/>
-                        <a:t>light brown</a:t>
-                      </a:r>
-                      <a:endParaRPr lang="en-CA" dirty="0"/>
-                    </a:p>
-                  </a:txBody>
-                  <a:tcPr/>
-                </a:tc>
-              </a:tr>
-              <a:tr h="370840">
-                <a:tc>
-                  <a:txBody>
-                    <a:bodyPr/>
-                    <a:lstStyle/>
-                    <a:p>
-                      <a:pPr algn="ctr"/>
-                      <a:r>
-                        <a:rPr lang="en-CA" dirty="0" smtClean="0"/>
-                        <a:t>chocolate</a:t>
-                      </a:r>
-                      <a:endParaRPr lang="en-CA" dirty="0"/>
-                    </a:p>
-                  </a:txBody>
-                  <a:tcPr/>
-                </a:tc>
-                <a:tc>
-                  <a:txBody>
-                    <a:bodyPr/>
-                    <a:lstStyle/>
-                    <a:p>
-                      <a:pPr algn="ctr"/>
-                      <a:r>
-                        <a:rPr lang="en-CA" dirty="0" smtClean="0"/>
-                        <a:t>dark brown</a:t>
-                      </a:r>
-                      <a:endParaRPr lang="en-CA" dirty="0"/>
-                    </a:p>
-                  </a:txBody>
-                  <a:tcPr/>
-                </a:tc>
-              </a:tr>
-              <a:tr h="370840">
-                <a:tc>
-                  <a:txBody>
-                    <a:bodyPr/>
-                    <a:lstStyle/>
-                    <a:p>
-                      <a:pPr algn="ctr"/>
-                      <a:r>
-                        <a:rPr lang="en-CA" dirty="0" smtClean="0"/>
-                        <a:t>strawberry</a:t>
-                      </a:r>
-                      <a:endParaRPr lang="en-CA" dirty="0"/>
-                    </a:p>
-                  </a:txBody>
-                  <a:tcPr/>
-                </a:tc>
-                <a:tc>
-                  <a:txBody>
-                    <a:bodyPr/>
-                    <a:lstStyle/>
-                    <a:p>
-                      <a:pPr algn="ctr"/>
-                      <a:r>
-                        <a:rPr lang="en-CA" dirty="0" smtClean="0"/>
-                        <a:t>pink </a:t>
-                      </a:r>
-                      <a:endParaRPr lang="en-CA" dirty="0"/>
-                    </a:p>
-                  </a:txBody>
-                  <a:tcPr/>
-                </a:tc>
-              </a:tr>
-              <a:tr h="370840">
-                <a:tc>
-                  <a:txBody>
-                    <a:bodyPr/>
-                    <a:lstStyle/>
-                    <a:p>
-                      <a:pPr algn="ctr"/>
-                      <a:r>
-                        <a:rPr lang="en-CA" dirty="0" smtClean="0"/>
-                        <a:t>chocolate</a:t>
-                      </a:r>
-                      <a:endParaRPr lang="en-CA" dirty="0"/>
-                    </a:p>
-                  </a:txBody>
-                  <a:tcPr/>
-                </a:tc>
-                <a:tc>
-                  <a:txBody>
-                    <a:bodyPr/>
-                    <a:lstStyle/>
-                    <a:p>
-                      <a:pPr algn="ctr"/>
-                      <a:r>
-                        <a:rPr lang="en-CA" dirty="0" smtClean="0"/>
-                        <a:t>dark brown</a:t>
-                      </a:r>
-                      <a:endParaRPr lang="en-CA" dirty="0"/>
-                    </a:p>
-                  </a:txBody>
-                  <a:tcPr/>
-                </a:tc>
-              </a:tr>
-              <a:tr h="370840">
-                <a:tc>
-                  <a:txBody>
-                    <a:bodyPr/>
-                    <a:lstStyle/>
-                    <a:p>
-                      <a:pPr algn="ctr"/>
-                      <a:r>
-                        <a:rPr lang="en-CA" dirty="0" smtClean="0"/>
-                        <a:t>vanilla</a:t>
-                      </a:r>
-                      <a:endParaRPr lang="en-CA" dirty="0"/>
-                    </a:p>
-                  </a:txBody>
-                  <a:tcPr/>
-                </a:tc>
-                <a:tc>
-                  <a:txBody>
-                    <a:bodyPr/>
-                    <a:lstStyle/>
-                    <a:p>
-                      <a:pPr algn="ctr"/>
-                      <a:r>
-                        <a:rPr lang="en-CA" dirty="0" smtClean="0"/>
-                        <a:t>white </a:t>
-                      </a:r>
-                      <a:endParaRPr lang="en-CA" dirty="0"/>
-                    </a:p>
-                  </a:txBody>
-                  <a:tcPr/>
-                </a:tc>
-              </a:tr>
-            </a:tbl>
-          </a:graphicData>
-        </a:graphic>
-      </p:graphicFrame>
-      <p:sp>
-        <p:nvSpPr>
-          <p:cNvPr id="6" name="TextBox 5"/>
-          <p:cNvSpPr txBox="1"/>
-          <p:nvPr/>
-        </p:nvSpPr>
-        <p:spPr>
-          <a:xfrm>
-            <a:off x="533400" y="4733925"/>
-            <a:ext cx="8077200" cy="1323439"/>
-          </a:xfrm>
-          <a:prstGeom prst="rect">
-            <a:avLst/>
-          </a:prstGeom>
-          <a:noFill/>
-        </p:spPr>
-        <p:txBody>
-          <a:bodyPr wrap="square" rtlCol="0">
-            <a:spAutoFit/>
-          </a:bodyPr>
-          <a:lstStyle/>
-          <a:p>
-            <a:pPr algn="ctr"/>
-            <a:r>
-              <a:rPr lang="en-CA" sz="2200" dirty="0" err="1" smtClean="0"/>
-              <a:t>cones.group</a:t>
-            </a:r>
-            <a:r>
-              <a:rPr lang="en-CA" sz="2200" dirty="0" smtClean="0"/>
-              <a:t>(“Flavour”)</a:t>
-            </a:r>
-          </a:p>
-          <a:p>
-            <a:pPr algn="ctr"/>
-            <a:endParaRPr lang="en-CA" sz="2200" dirty="0" smtClean="0"/>
-          </a:p>
-          <a:p>
-            <a:pPr algn="ctr"/>
-            <a:r>
-              <a:rPr lang="en-CA" sz="1400" dirty="0">
-                <a:hlinkClick r:id="rId2"/>
-              </a:rPr>
-              <a:t>https://</a:t>
-            </a:r>
-            <a:r>
-              <a:rPr lang="en-CA" sz="1400" dirty="0" smtClean="0">
-                <a:hlinkClick r:id="rId2"/>
-              </a:rPr>
-              <a:t>www.youtube.com/watch?v=HLoYTCUP0fc</a:t>
-            </a:r>
-            <a:endParaRPr lang="en-CA" sz="1400" dirty="0" smtClean="0"/>
-          </a:p>
-          <a:p>
-            <a:pPr algn="ctr"/>
-            <a:endParaRPr lang="en-CA" sz="2200" dirty="0"/>
           </a:p>
         </p:txBody>
       </p:sp>
     </p:spTree>
     <p:extLst>
       <p:ext uri="{BB962C8B-B14F-4D97-AF65-F5344CB8AC3E}">
-        <p14:creationId xmlns:p14="http://schemas.microsoft.com/office/powerpoint/2010/main" val="3087955482"/>
+        <p14:creationId xmlns:p14="http://schemas.microsoft.com/office/powerpoint/2010/main" val="203414778"/>
       </p:ext>
     </p:extLst>
   </p:cSld>
@@ -8198,1392 +8001,6 @@
           </a:xfrm>
         </p:spPr>
         <p:txBody>
-          <a:bodyPr>
-            <a:normAutofit/>
-          </a:bodyPr>
-          <a:lstStyle/>
-          <a:p>
-            <a:r>
-              <a:rPr lang="en-CA" dirty="0" smtClean="0">
-                <a:latin typeface="+mn-lt"/>
-              </a:rPr>
-              <a:t>Pivot</a:t>
-            </a:r>
-            <a:endParaRPr lang="en-CA" dirty="0">
-              <a:latin typeface="+mn-lt"/>
-            </a:endParaRPr>
-          </a:p>
-        </p:txBody>
-      </p:sp>
-      <p:graphicFrame>
-        <p:nvGraphicFramePr>
-          <p:cNvPr id="5" name="Content Placeholder 4"/>
-          <p:cNvGraphicFramePr>
-            <a:graphicFrameLocks noGrp="1"/>
-          </p:cNvGraphicFramePr>
-          <p:nvPr>
-            <p:ph idx="1"/>
-            <p:extLst>
-              <p:ext uri="{D42A27DB-BD31-4B8C-83A1-F6EECF244321}">
-                <p14:modId xmlns:p14="http://schemas.microsoft.com/office/powerpoint/2010/main" val="2884227785"/>
-              </p:ext>
-            </p:extLst>
-          </p:nvPr>
-        </p:nvGraphicFramePr>
-        <p:xfrm>
-          <a:off x="457200" y="1757363"/>
-          <a:ext cx="8286750" cy="2595880"/>
-        </p:xfrm>
-        <a:graphic>
-          <a:graphicData uri="http://schemas.openxmlformats.org/drawingml/2006/table">
-            <a:tbl>
-              <a:tblPr firstRow="1" bandRow="1">
-                <a:tableStyleId>{5C22544A-7EE6-4342-B048-85BDC9FD1C3A}</a:tableStyleId>
-              </a:tblPr>
-              <a:tblGrid>
-                <a:gridCol w="2762250"/>
-                <a:gridCol w="2762250"/>
-                <a:gridCol w="2762250"/>
-              </a:tblGrid>
-              <a:tr h="370840">
-                <a:tc>
-                  <a:txBody>
-                    <a:bodyPr/>
-                    <a:lstStyle/>
-                    <a:p>
-                      <a:pPr algn="ctr"/>
-                      <a:r>
-                        <a:rPr lang="en-CA" dirty="0" smtClean="0"/>
-                        <a:t>Flavour</a:t>
-                      </a:r>
-                      <a:endParaRPr lang="en-CA" dirty="0"/>
-                    </a:p>
-                  </a:txBody>
-                  <a:tcPr/>
-                </a:tc>
-                <a:tc>
-                  <a:txBody>
-                    <a:bodyPr/>
-                    <a:lstStyle/>
-                    <a:p>
-                      <a:pPr algn="ctr"/>
-                      <a:r>
-                        <a:rPr lang="en-CA" dirty="0" smtClean="0"/>
-                        <a:t>Colour</a:t>
-                      </a:r>
-                      <a:endParaRPr lang="en-CA" dirty="0"/>
-                    </a:p>
-                  </a:txBody>
-                  <a:tcPr/>
-                </a:tc>
-                <a:tc>
-                  <a:txBody>
-                    <a:bodyPr/>
-                    <a:lstStyle/>
-                    <a:p>
-                      <a:pPr algn="ctr"/>
-                      <a:r>
-                        <a:rPr lang="en-CA" dirty="0" smtClean="0"/>
-                        <a:t>Price</a:t>
-                      </a:r>
-                      <a:endParaRPr lang="en-CA" dirty="0"/>
-                    </a:p>
-                  </a:txBody>
-                  <a:tcPr/>
-                </a:tc>
-              </a:tr>
-              <a:tr h="370840">
-                <a:tc>
-                  <a:txBody>
-                    <a:bodyPr/>
-                    <a:lstStyle/>
-                    <a:p>
-                      <a:pPr algn="ctr"/>
-                      <a:r>
-                        <a:rPr lang="en-CA" dirty="0" smtClean="0"/>
-                        <a:t>strawberry</a:t>
-                      </a:r>
-                      <a:endParaRPr lang="en-CA" dirty="0"/>
-                    </a:p>
-                  </a:txBody>
-                  <a:tcPr/>
-                </a:tc>
-                <a:tc>
-                  <a:txBody>
-                    <a:bodyPr/>
-                    <a:lstStyle/>
-                    <a:p>
-                      <a:pPr algn="ctr"/>
-                      <a:r>
-                        <a:rPr lang="en-CA" dirty="0" smtClean="0"/>
-                        <a:t>pink</a:t>
-                      </a:r>
-                      <a:endParaRPr lang="en-CA" dirty="0"/>
-                    </a:p>
-                  </a:txBody>
-                  <a:tcPr/>
-                </a:tc>
-                <a:tc>
-                  <a:txBody>
-                    <a:bodyPr/>
-                    <a:lstStyle/>
-                    <a:p>
-                      <a:pPr algn="ctr"/>
-                      <a:r>
-                        <a:rPr lang="en-CA" dirty="0" smtClean="0"/>
-                        <a:t>2.5</a:t>
-                      </a:r>
-                      <a:endParaRPr lang="en-CA" dirty="0"/>
-                    </a:p>
-                  </a:txBody>
-                  <a:tcPr/>
-                </a:tc>
-              </a:tr>
-              <a:tr h="370840">
-                <a:tc>
-                  <a:txBody>
-                    <a:bodyPr/>
-                    <a:lstStyle/>
-                    <a:p>
-                      <a:pPr algn="ctr"/>
-                      <a:r>
-                        <a:rPr lang="en-CA" dirty="0" smtClean="0"/>
-                        <a:t>chocolate</a:t>
-                      </a:r>
-                      <a:endParaRPr lang="en-CA" dirty="0"/>
-                    </a:p>
-                  </a:txBody>
-                  <a:tcPr/>
-                </a:tc>
-                <a:tc>
-                  <a:txBody>
-                    <a:bodyPr/>
-                    <a:lstStyle/>
-                    <a:p>
-                      <a:pPr algn="ctr"/>
-                      <a:r>
-                        <a:rPr lang="en-CA" dirty="0" smtClean="0"/>
-                        <a:t>light brown</a:t>
-                      </a:r>
-                      <a:endParaRPr lang="en-CA" dirty="0"/>
-                    </a:p>
-                  </a:txBody>
-                  <a:tcPr/>
-                </a:tc>
-                <a:tc>
-                  <a:txBody>
-                    <a:bodyPr/>
-                    <a:lstStyle/>
-                    <a:p>
-                      <a:pPr algn="ctr"/>
-                      <a:r>
-                        <a:rPr lang="en-CA" dirty="0" smtClean="0"/>
-                        <a:t>3</a:t>
-                      </a:r>
-                      <a:endParaRPr lang="en-CA" dirty="0"/>
-                    </a:p>
-                  </a:txBody>
-                  <a:tcPr/>
-                </a:tc>
-              </a:tr>
-              <a:tr h="370840">
-                <a:tc>
-                  <a:txBody>
-                    <a:bodyPr/>
-                    <a:lstStyle/>
-                    <a:p>
-                      <a:pPr algn="ctr"/>
-                      <a:r>
-                        <a:rPr lang="en-CA" dirty="0" smtClean="0"/>
-                        <a:t>chocolate</a:t>
-                      </a:r>
-                      <a:endParaRPr lang="en-CA" dirty="0"/>
-                    </a:p>
-                  </a:txBody>
-                  <a:tcPr/>
-                </a:tc>
-                <a:tc>
-                  <a:txBody>
-                    <a:bodyPr/>
-                    <a:lstStyle/>
-                    <a:p>
-                      <a:pPr algn="ctr"/>
-                      <a:r>
-                        <a:rPr lang="en-CA" dirty="0" smtClean="0"/>
-                        <a:t>dark brown</a:t>
-                      </a:r>
-                      <a:endParaRPr lang="en-CA" dirty="0"/>
-                    </a:p>
-                  </a:txBody>
-                  <a:tcPr/>
-                </a:tc>
-                <a:tc>
-                  <a:txBody>
-                    <a:bodyPr/>
-                    <a:lstStyle/>
-                    <a:p>
-                      <a:pPr algn="ctr"/>
-                      <a:r>
-                        <a:rPr lang="en-CA" dirty="0" smtClean="0"/>
-                        <a:t>3.5</a:t>
-                      </a:r>
-                      <a:endParaRPr lang="en-CA" dirty="0"/>
-                    </a:p>
-                  </a:txBody>
-                  <a:tcPr/>
-                </a:tc>
-              </a:tr>
-              <a:tr h="370840">
-                <a:tc>
-                  <a:txBody>
-                    <a:bodyPr/>
-                    <a:lstStyle/>
-                    <a:p>
-                      <a:pPr algn="ctr"/>
-                      <a:r>
-                        <a:rPr lang="en-CA" dirty="0" smtClean="0"/>
-                        <a:t>strawberry</a:t>
-                      </a:r>
-                      <a:endParaRPr lang="en-CA" dirty="0"/>
-                    </a:p>
-                  </a:txBody>
-                  <a:tcPr/>
-                </a:tc>
-                <a:tc>
-                  <a:txBody>
-                    <a:bodyPr/>
-                    <a:lstStyle/>
-                    <a:p>
-                      <a:pPr algn="ctr"/>
-                      <a:r>
-                        <a:rPr lang="en-CA" dirty="0" smtClean="0"/>
-                        <a:t>pink </a:t>
-                      </a:r>
-                      <a:endParaRPr lang="en-CA" dirty="0"/>
-                    </a:p>
-                  </a:txBody>
-                  <a:tcPr/>
-                </a:tc>
-                <a:tc>
-                  <a:txBody>
-                    <a:bodyPr/>
-                    <a:lstStyle/>
-                    <a:p>
-                      <a:pPr algn="ctr"/>
-                      <a:r>
-                        <a:rPr lang="en-CA" dirty="0" smtClean="0"/>
-                        <a:t>2.5</a:t>
-                      </a:r>
-                      <a:endParaRPr lang="en-CA" dirty="0"/>
-                    </a:p>
-                  </a:txBody>
-                  <a:tcPr/>
-                </a:tc>
-              </a:tr>
-              <a:tr h="370840">
-                <a:tc>
-                  <a:txBody>
-                    <a:bodyPr/>
-                    <a:lstStyle/>
-                    <a:p>
-                      <a:pPr algn="ctr"/>
-                      <a:r>
-                        <a:rPr lang="en-CA" dirty="0" smtClean="0"/>
-                        <a:t>chocolate</a:t>
-                      </a:r>
-                      <a:endParaRPr lang="en-CA" dirty="0"/>
-                    </a:p>
-                  </a:txBody>
-                  <a:tcPr/>
-                </a:tc>
-                <a:tc>
-                  <a:txBody>
-                    <a:bodyPr/>
-                    <a:lstStyle/>
-                    <a:p>
-                      <a:pPr algn="ctr"/>
-                      <a:r>
-                        <a:rPr lang="en-CA" dirty="0" smtClean="0"/>
-                        <a:t>dark brown</a:t>
-                      </a:r>
-                      <a:endParaRPr lang="en-CA" dirty="0"/>
-                    </a:p>
-                  </a:txBody>
-                  <a:tcPr/>
-                </a:tc>
-                <a:tc>
-                  <a:txBody>
-                    <a:bodyPr/>
-                    <a:lstStyle/>
-                    <a:p>
-                      <a:pPr algn="ctr"/>
-                      <a:r>
-                        <a:rPr lang="en-CA" dirty="0" smtClean="0"/>
-                        <a:t>3.5</a:t>
-                      </a:r>
-                      <a:endParaRPr lang="en-CA" dirty="0"/>
-                    </a:p>
-                  </a:txBody>
-                  <a:tcPr/>
-                </a:tc>
-              </a:tr>
-              <a:tr h="370840">
-                <a:tc>
-                  <a:txBody>
-                    <a:bodyPr/>
-                    <a:lstStyle/>
-                    <a:p>
-                      <a:pPr algn="ctr"/>
-                      <a:r>
-                        <a:rPr lang="en-CA" dirty="0" smtClean="0"/>
-                        <a:t>vanilla</a:t>
-                      </a:r>
-                      <a:endParaRPr lang="en-CA" dirty="0"/>
-                    </a:p>
-                  </a:txBody>
-                  <a:tcPr/>
-                </a:tc>
-                <a:tc>
-                  <a:txBody>
-                    <a:bodyPr/>
-                    <a:lstStyle/>
-                    <a:p>
-                      <a:pPr algn="ctr"/>
-                      <a:r>
-                        <a:rPr lang="en-CA" dirty="0" smtClean="0"/>
-                        <a:t>white </a:t>
-                      </a:r>
-                      <a:endParaRPr lang="en-CA" dirty="0"/>
-                    </a:p>
-                  </a:txBody>
-                  <a:tcPr/>
-                </a:tc>
-                <a:tc>
-                  <a:txBody>
-                    <a:bodyPr/>
-                    <a:lstStyle/>
-                    <a:p>
-                      <a:pPr algn="ctr"/>
-                      <a:r>
-                        <a:rPr lang="en-CA" dirty="0" smtClean="0"/>
-                        <a:t>3</a:t>
-                      </a:r>
-                      <a:endParaRPr lang="en-CA" dirty="0"/>
-                    </a:p>
-                  </a:txBody>
-                  <a:tcPr/>
-                </a:tc>
-              </a:tr>
-            </a:tbl>
-          </a:graphicData>
-        </a:graphic>
-      </p:graphicFrame>
-      <p:sp>
-        <p:nvSpPr>
-          <p:cNvPr id="6" name="TextBox 5"/>
-          <p:cNvSpPr txBox="1"/>
-          <p:nvPr/>
-        </p:nvSpPr>
-        <p:spPr>
-          <a:xfrm>
-            <a:off x="533400" y="4733925"/>
-            <a:ext cx="8077200" cy="1323439"/>
-          </a:xfrm>
-          <a:prstGeom prst="rect">
-            <a:avLst/>
-          </a:prstGeom>
-          <a:noFill/>
-        </p:spPr>
-        <p:txBody>
-          <a:bodyPr wrap="square" rtlCol="0">
-            <a:spAutoFit/>
-          </a:bodyPr>
-          <a:lstStyle/>
-          <a:p>
-            <a:pPr algn="ctr"/>
-            <a:r>
-              <a:rPr lang="en-CA" sz="2200" dirty="0" err="1" smtClean="0"/>
-              <a:t>cones.pivot</a:t>
-            </a:r>
-            <a:r>
-              <a:rPr lang="en-CA" sz="2200" dirty="0" smtClean="0"/>
-              <a:t>(“</a:t>
-            </a:r>
-            <a:r>
-              <a:rPr lang="en-CA" sz="2200" dirty="0" err="1" smtClean="0"/>
-              <a:t>Flavour”,”Colour”,”Price</a:t>
-            </a:r>
-            <a:r>
-              <a:rPr lang="en-CA" sz="2200" dirty="0" smtClean="0"/>
-              <a:t>”, </a:t>
-            </a:r>
-            <a:r>
-              <a:rPr lang="en-CA" sz="2200" dirty="0" err="1" smtClean="0"/>
-              <a:t>np.sum</a:t>
-            </a:r>
-            <a:r>
-              <a:rPr lang="en-CA" sz="2200" dirty="0" smtClean="0"/>
-              <a:t>)</a:t>
-            </a:r>
-          </a:p>
-          <a:p>
-            <a:pPr algn="ctr"/>
-            <a:endParaRPr lang="en-CA" sz="2200" dirty="0" smtClean="0"/>
-          </a:p>
-          <a:p>
-            <a:pPr algn="ctr"/>
-            <a:r>
-              <a:rPr lang="en-CA" sz="1400" dirty="0">
-                <a:hlinkClick r:id="rId2"/>
-              </a:rPr>
-              <a:t>https://</a:t>
-            </a:r>
-            <a:r>
-              <a:rPr lang="en-CA" sz="1400" dirty="0" smtClean="0">
-                <a:hlinkClick r:id="rId2"/>
-              </a:rPr>
-              <a:t>www.youtube.com/watch?v=4WzXo8eKLAg</a:t>
-            </a:r>
-            <a:endParaRPr lang="en-CA" sz="1400" dirty="0" smtClean="0"/>
-          </a:p>
-          <a:p>
-            <a:pPr algn="ctr"/>
-            <a:endParaRPr lang="en-CA" sz="2200" dirty="0"/>
-          </a:p>
-        </p:txBody>
-      </p:sp>
-      <p:sp>
-        <p:nvSpPr>
-          <p:cNvPr id="3" name="TextBox 2"/>
-          <p:cNvSpPr txBox="1"/>
-          <p:nvPr/>
-        </p:nvSpPr>
-        <p:spPr>
-          <a:xfrm>
-            <a:off x="3200399" y="4446686"/>
-            <a:ext cx="888385" cy="307777"/>
-          </a:xfrm>
-          <a:prstGeom prst="rect">
-            <a:avLst/>
-          </a:prstGeom>
-          <a:noFill/>
-        </p:spPr>
-        <p:txBody>
-          <a:bodyPr wrap="none" rtlCol="0">
-            <a:spAutoFit/>
-          </a:bodyPr>
-          <a:lstStyle/>
-          <a:p>
-            <a:r>
-              <a:rPr lang="en-CA" sz="1400" dirty="0" smtClean="0"/>
-              <a:t>Columns</a:t>
-            </a:r>
-            <a:endParaRPr lang="en-CA" sz="1400" dirty="0"/>
-          </a:p>
-        </p:txBody>
-      </p:sp>
-      <p:sp>
-        <p:nvSpPr>
-          <p:cNvPr id="7" name="TextBox 6"/>
-          <p:cNvSpPr txBox="1"/>
-          <p:nvPr/>
-        </p:nvSpPr>
-        <p:spPr>
-          <a:xfrm>
-            <a:off x="4457699" y="4446686"/>
-            <a:ext cx="603050" cy="307777"/>
-          </a:xfrm>
-          <a:prstGeom prst="rect">
-            <a:avLst/>
-          </a:prstGeom>
-          <a:noFill/>
-        </p:spPr>
-        <p:txBody>
-          <a:bodyPr wrap="none" rtlCol="0">
-            <a:spAutoFit/>
-          </a:bodyPr>
-          <a:lstStyle/>
-          <a:p>
-            <a:r>
-              <a:rPr lang="en-CA" sz="1400" dirty="0" smtClean="0"/>
-              <a:t>Rows</a:t>
-            </a:r>
-            <a:endParaRPr lang="en-CA" sz="1400" dirty="0"/>
-          </a:p>
-        </p:txBody>
-      </p:sp>
-    </p:spTree>
-    <p:extLst>
-      <p:ext uri="{BB962C8B-B14F-4D97-AF65-F5344CB8AC3E}">
-        <p14:creationId xmlns:p14="http://schemas.microsoft.com/office/powerpoint/2010/main" val="2663667579"/>
-      </p:ext>
-    </p:extLst>
-  </p:cSld>
-  <p:clrMapOvr>
-    <a:masterClrMapping/>
-  </p:clrMapOvr>
-  <p:timing>
-    <p:tnLst>
-      <p:par>
-        <p:cTn id="1" dur="indefinite" restart="never" nodeType="tmRoot"/>
-      </p:par>
-    </p:tnLst>
-  </p:timing>
-</p:sld>
-</file>
-
-<file path=ppt/slides/slide4.xml><?xml version="1.0" encoding="utf-8"?>
-<p:sld xmlns:a="http://schemas.openxmlformats.org/drawingml/2006/main" xmlns:r="http://schemas.openxmlformats.org/officeDocument/2006/relationships" xmlns:p="http://schemas.openxmlformats.org/presentationml/2006/main">
-  <p:cSld>
-    <p:spTree>
-      <p:nvGrpSpPr>
-        <p:cNvPr id="1" name=""/>
-        <p:cNvGrpSpPr/>
-        <p:nvPr/>
-      </p:nvGrpSpPr>
-      <p:grpSpPr>
-        <a:xfrm>
-          <a:off x="0" y="0"/>
-          <a:ext cx="0" cy="0"/>
-          <a:chOff x="0" y="0"/>
-          <a:chExt cx="0" cy="0"/>
-        </a:xfrm>
-      </p:grpSpPr>
-      <p:sp>
-        <p:nvSpPr>
-          <p:cNvPr id="2" name="Title 1"/>
-          <p:cNvSpPr>
-            <a:spLocks noGrp="1"/>
-          </p:cNvSpPr>
-          <p:nvPr>
-            <p:ph type="title"/>
-          </p:nvPr>
-        </p:nvSpPr>
-        <p:spPr>
-          <a:xfrm>
-            <a:off x="457200" y="449932"/>
-            <a:ext cx="8286750" cy="1150353"/>
-          </a:xfrm>
-        </p:spPr>
-        <p:txBody>
-          <a:bodyPr>
-            <a:normAutofit/>
-          </a:bodyPr>
-          <a:lstStyle/>
-          <a:p>
-            <a:r>
-              <a:rPr lang="en-CA" dirty="0" smtClean="0">
-                <a:latin typeface="+mn-lt"/>
-              </a:rPr>
-              <a:t>Joins – See Worksheet Q2</a:t>
-            </a:r>
-            <a:endParaRPr lang="en-CA" dirty="0">
-              <a:latin typeface="+mn-lt"/>
-            </a:endParaRPr>
-          </a:p>
-        </p:txBody>
-      </p:sp>
-      <p:graphicFrame>
-        <p:nvGraphicFramePr>
-          <p:cNvPr id="5" name="Content Placeholder 4"/>
-          <p:cNvGraphicFramePr>
-            <a:graphicFrameLocks noGrp="1"/>
-          </p:cNvGraphicFramePr>
-          <p:nvPr>
-            <p:ph idx="1"/>
-            <p:extLst>
-              <p:ext uri="{D42A27DB-BD31-4B8C-83A1-F6EECF244321}">
-                <p14:modId xmlns:p14="http://schemas.microsoft.com/office/powerpoint/2010/main" val="4275476882"/>
-              </p:ext>
-            </p:extLst>
-          </p:nvPr>
-        </p:nvGraphicFramePr>
-        <p:xfrm>
-          <a:off x="457200" y="1757363"/>
-          <a:ext cx="4629152" cy="2595880"/>
-        </p:xfrm>
-        <a:graphic>
-          <a:graphicData uri="http://schemas.openxmlformats.org/drawingml/2006/table">
-            <a:tbl>
-              <a:tblPr firstRow="1" bandRow="1">
-                <a:tableStyleId>{5C22544A-7EE6-4342-B048-85BDC9FD1C3A}</a:tableStyleId>
-              </a:tblPr>
-              <a:tblGrid>
-                <a:gridCol w="1157288"/>
-                <a:gridCol w="1157288"/>
-                <a:gridCol w="1157288"/>
-                <a:gridCol w="1157288"/>
-              </a:tblGrid>
-              <a:tr h="370840">
-                <a:tc>
-                  <a:txBody>
-                    <a:bodyPr/>
-                    <a:lstStyle/>
-                    <a:p>
-                      <a:pPr algn="ctr"/>
-                      <a:r>
-                        <a:rPr lang="en-CA" dirty="0" smtClean="0"/>
-                        <a:t>Colour</a:t>
-                      </a:r>
-                      <a:endParaRPr lang="en-CA" dirty="0"/>
-                    </a:p>
-                  </a:txBody>
-                  <a:tcPr/>
-                </a:tc>
-                <a:tc>
-                  <a:txBody>
-                    <a:bodyPr/>
-                    <a:lstStyle/>
-                    <a:p>
-                      <a:pPr algn="ctr"/>
-                      <a:r>
-                        <a:rPr lang="en-CA" dirty="0" smtClean="0"/>
-                        <a:t>Shape</a:t>
-                      </a:r>
-                      <a:endParaRPr lang="en-CA" dirty="0"/>
-                    </a:p>
-                  </a:txBody>
-                  <a:tcPr/>
-                </a:tc>
-                <a:tc>
-                  <a:txBody>
-                    <a:bodyPr/>
-                    <a:lstStyle/>
-                    <a:p>
-                      <a:pPr algn="ctr"/>
-                      <a:r>
-                        <a:rPr lang="en-CA" dirty="0" smtClean="0"/>
-                        <a:t>Amount</a:t>
-                      </a:r>
-                      <a:endParaRPr lang="en-CA" dirty="0"/>
-                    </a:p>
-                  </a:txBody>
-                  <a:tcPr/>
-                </a:tc>
-                <a:tc>
-                  <a:txBody>
-                    <a:bodyPr/>
-                    <a:lstStyle/>
-                    <a:p>
-                      <a:pPr algn="ctr"/>
-                      <a:r>
-                        <a:rPr lang="en-CA" dirty="0" smtClean="0"/>
-                        <a:t>Price</a:t>
-                      </a:r>
-                      <a:endParaRPr lang="en-CA" dirty="0"/>
-                    </a:p>
-                  </a:txBody>
-                  <a:tcPr/>
-                </a:tc>
-              </a:tr>
-              <a:tr h="370840">
-                <a:tc>
-                  <a:txBody>
-                    <a:bodyPr/>
-                    <a:lstStyle/>
-                    <a:p>
-                      <a:pPr algn="ctr"/>
-                      <a:r>
-                        <a:rPr lang="en-CA" dirty="0" smtClean="0"/>
-                        <a:t>red</a:t>
-                      </a:r>
-                      <a:endParaRPr lang="en-CA" dirty="0"/>
-                    </a:p>
-                  </a:txBody>
-                  <a:tcPr/>
-                </a:tc>
-                <a:tc>
-                  <a:txBody>
-                    <a:bodyPr/>
-                    <a:lstStyle/>
-                    <a:p>
-                      <a:pPr algn="ctr"/>
-                      <a:r>
-                        <a:rPr lang="en-CA" dirty="0" smtClean="0"/>
-                        <a:t>Round</a:t>
-                      </a:r>
-                      <a:endParaRPr lang="en-CA" dirty="0"/>
-                    </a:p>
-                  </a:txBody>
-                  <a:tcPr/>
-                </a:tc>
-                <a:tc>
-                  <a:txBody>
-                    <a:bodyPr/>
-                    <a:lstStyle/>
-                    <a:p>
-                      <a:pPr algn="ctr"/>
-                      <a:r>
-                        <a:rPr lang="en-CA" dirty="0" smtClean="0"/>
-                        <a:t>4</a:t>
-                      </a:r>
-                      <a:endParaRPr lang="en-CA" dirty="0"/>
-                    </a:p>
-                  </a:txBody>
-                  <a:tcPr/>
-                </a:tc>
-                <a:tc>
-                  <a:txBody>
-                    <a:bodyPr/>
-                    <a:lstStyle/>
-                    <a:p>
-                      <a:pPr algn="ctr"/>
-                      <a:r>
-                        <a:rPr lang="en-CA" dirty="0" smtClean="0"/>
-                        <a:t>1.3</a:t>
-                      </a:r>
-                      <a:endParaRPr lang="en-CA" dirty="0"/>
-                    </a:p>
-                  </a:txBody>
-                  <a:tcPr/>
-                </a:tc>
-              </a:tr>
-              <a:tr h="370840">
-                <a:tc>
-                  <a:txBody>
-                    <a:bodyPr/>
-                    <a:lstStyle/>
-                    <a:p>
-                      <a:pPr algn="ctr"/>
-                      <a:r>
-                        <a:rPr lang="en-CA" dirty="0" smtClean="0"/>
-                        <a:t>green</a:t>
-                      </a:r>
-                      <a:endParaRPr lang="en-CA" dirty="0"/>
-                    </a:p>
-                  </a:txBody>
-                  <a:tcPr/>
-                </a:tc>
-                <a:tc>
-                  <a:txBody>
-                    <a:bodyPr/>
-                    <a:lstStyle/>
-                    <a:p>
-                      <a:pPr algn="ctr"/>
-                      <a:r>
-                        <a:rPr lang="en-CA" dirty="0" err="1" smtClean="0"/>
-                        <a:t>Rect</a:t>
-                      </a:r>
-                      <a:endParaRPr lang="en-CA" dirty="0"/>
-                    </a:p>
-                  </a:txBody>
-                  <a:tcPr/>
-                </a:tc>
-                <a:tc>
-                  <a:txBody>
-                    <a:bodyPr/>
-                    <a:lstStyle/>
-                    <a:p>
-                      <a:pPr algn="ctr"/>
-                      <a:r>
-                        <a:rPr lang="en-CA" dirty="0" smtClean="0"/>
-                        <a:t>6</a:t>
-                      </a:r>
-                      <a:endParaRPr lang="en-CA" dirty="0"/>
-                    </a:p>
-                  </a:txBody>
-                  <a:tcPr/>
-                </a:tc>
-                <a:tc>
-                  <a:txBody>
-                    <a:bodyPr/>
-                    <a:lstStyle/>
-                    <a:p>
-                      <a:pPr algn="ctr"/>
-                      <a:r>
-                        <a:rPr lang="en-CA" dirty="0" smtClean="0"/>
-                        <a:t>1.2</a:t>
-                      </a:r>
-                      <a:endParaRPr lang="en-CA" dirty="0"/>
-                    </a:p>
-                  </a:txBody>
-                  <a:tcPr/>
-                </a:tc>
-              </a:tr>
-              <a:tr h="370840">
-                <a:tc>
-                  <a:txBody>
-                    <a:bodyPr/>
-                    <a:lstStyle/>
-                    <a:p>
-                      <a:pPr algn="ctr"/>
-                      <a:r>
-                        <a:rPr lang="en-CA" dirty="0" smtClean="0"/>
-                        <a:t>blue</a:t>
-                      </a:r>
-                      <a:endParaRPr lang="en-CA" dirty="0"/>
-                    </a:p>
-                  </a:txBody>
-                  <a:tcPr/>
-                </a:tc>
-                <a:tc>
-                  <a:txBody>
-                    <a:bodyPr/>
-                    <a:lstStyle/>
-                    <a:p>
-                      <a:pPr algn="ctr"/>
-                      <a:r>
-                        <a:rPr lang="en-CA" dirty="0" err="1" smtClean="0"/>
-                        <a:t>Rect</a:t>
-                      </a:r>
-                      <a:endParaRPr lang="en-CA" dirty="0"/>
-                    </a:p>
-                  </a:txBody>
-                  <a:tcPr/>
-                </a:tc>
-                <a:tc>
-                  <a:txBody>
-                    <a:bodyPr/>
-                    <a:lstStyle/>
-                    <a:p>
-                      <a:pPr algn="ctr"/>
-                      <a:r>
-                        <a:rPr lang="en-CA" dirty="0" smtClean="0"/>
-                        <a:t>21</a:t>
-                      </a:r>
-                      <a:endParaRPr lang="en-CA" dirty="0"/>
-                    </a:p>
-                  </a:txBody>
-                  <a:tcPr/>
-                </a:tc>
-                <a:tc>
-                  <a:txBody>
-                    <a:bodyPr/>
-                    <a:lstStyle/>
-                    <a:p>
-                      <a:pPr algn="ctr"/>
-                      <a:r>
-                        <a:rPr lang="en-CA" dirty="0" smtClean="0"/>
-                        <a:t>2</a:t>
-                      </a:r>
-                      <a:endParaRPr lang="en-CA" dirty="0"/>
-                    </a:p>
-                  </a:txBody>
-                  <a:tcPr/>
-                </a:tc>
-              </a:tr>
-              <a:tr h="370840">
-                <a:tc>
-                  <a:txBody>
-                    <a:bodyPr/>
-                    <a:lstStyle/>
-                    <a:p>
-                      <a:pPr algn="ctr"/>
-                      <a:r>
-                        <a:rPr lang="en-CA" dirty="0" smtClean="0"/>
-                        <a:t>red</a:t>
-                      </a:r>
-                      <a:endParaRPr lang="en-CA" dirty="0"/>
-                    </a:p>
-                  </a:txBody>
-                  <a:tcPr/>
-                </a:tc>
-                <a:tc>
-                  <a:txBody>
-                    <a:bodyPr/>
-                    <a:lstStyle/>
-                    <a:p>
-                      <a:pPr algn="ctr"/>
-                      <a:r>
-                        <a:rPr lang="en-CA" dirty="0" smtClean="0"/>
-                        <a:t>Round</a:t>
-                      </a:r>
-                      <a:endParaRPr lang="en-CA" dirty="0"/>
-                    </a:p>
-                  </a:txBody>
-                  <a:tcPr/>
-                </a:tc>
-                <a:tc>
-                  <a:txBody>
-                    <a:bodyPr/>
-                    <a:lstStyle/>
-                    <a:p>
-                      <a:pPr algn="ctr"/>
-                      <a:r>
-                        <a:rPr lang="en-CA" dirty="0" smtClean="0"/>
-                        <a:t>7</a:t>
-                      </a:r>
-                      <a:endParaRPr lang="en-CA" dirty="0"/>
-                    </a:p>
-                  </a:txBody>
-                  <a:tcPr/>
-                </a:tc>
-                <a:tc>
-                  <a:txBody>
-                    <a:bodyPr/>
-                    <a:lstStyle/>
-                    <a:p>
-                      <a:pPr algn="ctr"/>
-                      <a:r>
-                        <a:rPr lang="en-CA" dirty="0" smtClean="0"/>
-                        <a:t>1.75</a:t>
-                      </a:r>
-                      <a:endParaRPr lang="en-CA" dirty="0"/>
-                    </a:p>
-                  </a:txBody>
-                  <a:tcPr/>
-                </a:tc>
-              </a:tr>
-              <a:tr h="370840">
-                <a:tc>
-                  <a:txBody>
-                    <a:bodyPr/>
-                    <a:lstStyle/>
-                    <a:p>
-                      <a:pPr algn="ctr"/>
-                      <a:r>
-                        <a:rPr lang="en-CA" dirty="0" smtClean="0"/>
-                        <a:t>green</a:t>
-                      </a:r>
-                      <a:endParaRPr lang="en-CA" dirty="0"/>
-                    </a:p>
-                  </a:txBody>
-                  <a:tcPr/>
-                </a:tc>
-                <a:tc>
-                  <a:txBody>
-                    <a:bodyPr/>
-                    <a:lstStyle/>
-                    <a:p>
-                      <a:pPr algn="ctr"/>
-                      <a:r>
-                        <a:rPr lang="en-CA" dirty="0" err="1" smtClean="0"/>
-                        <a:t>Rect</a:t>
-                      </a:r>
-                      <a:endParaRPr lang="en-CA" dirty="0"/>
-                    </a:p>
-                  </a:txBody>
-                  <a:tcPr/>
-                </a:tc>
-                <a:tc>
-                  <a:txBody>
-                    <a:bodyPr/>
-                    <a:lstStyle/>
-                    <a:p>
-                      <a:pPr algn="ctr"/>
-                      <a:r>
-                        <a:rPr lang="en-CA" dirty="0" smtClean="0"/>
-                        <a:t>9</a:t>
-                      </a:r>
-                      <a:endParaRPr lang="en-CA" dirty="0"/>
-                    </a:p>
-                  </a:txBody>
-                  <a:tcPr/>
-                </a:tc>
-                <a:tc>
-                  <a:txBody>
-                    <a:bodyPr/>
-                    <a:lstStyle/>
-                    <a:p>
-                      <a:pPr algn="ctr"/>
-                      <a:r>
-                        <a:rPr lang="en-CA" dirty="0" smtClean="0"/>
-                        <a:t>1.4</a:t>
-                      </a:r>
-                      <a:endParaRPr lang="en-CA" dirty="0"/>
-                    </a:p>
-                  </a:txBody>
-                  <a:tcPr/>
-                </a:tc>
-              </a:tr>
-              <a:tr h="370840">
-                <a:tc>
-                  <a:txBody>
-                    <a:bodyPr/>
-                    <a:lstStyle/>
-                    <a:p>
-                      <a:pPr algn="ctr"/>
-                      <a:r>
-                        <a:rPr lang="en-CA" dirty="0" smtClean="0"/>
-                        <a:t>green</a:t>
-                      </a:r>
-                      <a:endParaRPr lang="en-CA" dirty="0"/>
-                    </a:p>
-                  </a:txBody>
-                  <a:tcPr/>
-                </a:tc>
-                <a:tc>
-                  <a:txBody>
-                    <a:bodyPr/>
-                    <a:lstStyle/>
-                    <a:p>
-                      <a:pPr algn="ctr"/>
-                      <a:r>
-                        <a:rPr lang="en-CA" dirty="0" smtClean="0"/>
-                        <a:t>Round</a:t>
-                      </a:r>
-                      <a:endParaRPr lang="en-CA" dirty="0"/>
-                    </a:p>
-                  </a:txBody>
-                  <a:tcPr/>
-                </a:tc>
-                <a:tc>
-                  <a:txBody>
-                    <a:bodyPr/>
-                    <a:lstStyle/>
-                    <a:p>
-                      <a:pPr algn="ctr"/>
-                      <a:r>
-                        <a:rPr lang="en-CA" dirty="0" smtClean="0"/>
-                        <a:t>2</a:t>
-                      </a:r>
-                      <a:endParaRPr lang="en-CA" dirty="0"/>
-                    </a:p>
-                  </a:txBody>
-                  <a:tcPr/>
-                </a:tc>
-                <a:tc>
-                  <a:txBody>
-                    <a:bodyPr/>
-                    <a:lstStyle/>
-                    <a:p>
-                      <a:pPr algn="ctr"/>
-                      <a:r>
-                        <a:rPr lang="en-CA" dirty="0" smtClean="0"/>
-                        <a:t>1</a:t>
-                      </a:r>
-                      <a:endParaRPr lang="en-CA" dirty="0"/>
-                    </a:p>
-                  </a:txBody>
-                  <a:tcPr/>
-                </a:tc>
-              </a:tr>
-            </a:tbl>
-          </a:graphicData>
-        </a:graphic>
-      </p:graphicFrame>
-      <p:sp>
-        <p:nvSpPr>
-          <p:cNvPr id="6" name="TextBox 5"/>
-          <p:cNvSpPr txBox="1"/>
-          <p:nvPr/>
-        </p:nvSpPr>
-        <p:spPr>
-          <a:xfrm>
-            <a:off x="533400" y="4733925"/>
-            <a:ext cx="8077200" cy="1323439"/>
-          </a:xfrm>
-          <a:prstGeom prst="rect">
-            <a:avLst/>
-          </a:prstGeom>
-          <a:noFill/>
-        </p:spPr>
-        <p:txBody>
-          <a:bodyPr wrap="square" rtlCol="0">
-            <a:spAutoFit/>
-          </a:bodyPr>
-          <a:lstStyle/>
-          <a:p>
-            <a:pPr algn="ctr"/>
-            <a:r>
-              <a:rPr lang="en-CA" sz="2200" dirty="0" err="1" smtClean="0"/>
-              <a:t>marbles.join</a:t>
-            </a:r>
-            <a:r>
-              <a:rPr lang="en-CA" sz="2200" dirty="0" smtClean="0"/>
-              <a:t>(“Shape”, weights, “Size”)</a:t>
-            </a:r>
-          </a:p>
-          <a:p>
-            <a:pPr algn="ctr"/>
-            <a:endParaRPr lang="en-CA" sz="2200" dirty="0" smtClean="0"/>
-          </a:p>
-          <a:p>
-            <a:pPr algn="ctr"/>
-            <a:r>
-              <a:rPr lang="en-CA" sz="1400" dirty="0">
-                <a:hlinkClick r:id="rId2"/>
-              </a:rPr>
-              <a:t>https://</a:t>
-            </a:r>
-            <a:r>
-              <a:rPr lang="en-CA" sz="1400" dirty="0" smtClean="0">
-                <a:hlinkClick r:id="rId2"/>
-              </a:rPr>
-              <a:t>www.youtube.com/watch?v=ZGPlcpACNC0</a:t>
-            </a:r>
-            <a:endParaRPr lang="en-CA" sz="1400" dirty="0" smtClean="0"/>
-          </a:p>
-          <a:p>
-            <a:pPr algn="ctr"/>
-            <a:endParaRPr lang="en-CA" sz="2200" dirty="0"/>
-          </a:p>
-        </p:txBody>
-      </p:sp>
-      <p:sp>
-        <p:nvSpPr>
-          <p:cNvPr id="3" name="TextBox 2"/>
-          <p:cNvSpPr txBox="1"/>
-          <p:nvPr/>
-        </p:nvSpPr>
-        <p:spPr>
-          <a:xfrm>
-            <a:off x="594276" y="4396859"/>
-            <a:ext cx="1002197" cy="369332"/>
-          </a:xfrm>
-          <a:prstGeom prst="rect">
-            <a:avLst/>
-          </a:prstGeom>
-          <a:noFill/>
-        </p:spPr>
-        <p:txBody>
-          <a:bodyPr wrap="none" rtlCol="0">
-            <a:spAutoFit/>
-          </a:bodyPr>
-          <a:lstStyle/>
-          <a:p>
-            <a:r>
-              <a:rPr lang="en-CA" dirty="0" smtClean="0"/>
-              <a:t>marbles</a:t>
-            </a:r>
-            <a:endParaRPr lang="en-CA" dirty="0"/>
-          </a:p>
-        </p:txBody>
-      </p:sp>
-      <p:graphicFrame>
-        <p:nvGraphicFramePr>
-          <p:cNvPr id="4" name="Table 3"/>
-          <p:cNvGraphicFramePr>
-            <a:graphicFrameLocks noGrp="1"/>
-          </p:cNvGraphicFramePr>
-          <p:nvPr>
-            <p:extLst>
-              <p:ext uri="{D42A27DB-BD31-4B8C-83A1-F6EECF244321}">
-                <p14:modId xmlns:p14="http://schemas.microsoft.com/office/powerpoint/2010/main" val="1105434848"/>
-              </p:ext>
-            </p:extLst>
-          </p:nvPr>
-        </p:nvGraphicFramePr>
-        <p:xfrm>
-          <a:off x="5915025" y="1800226"/>
-          <a:ext cx="2266950" cy="1483360"/>
-        </p:xfrm>
-        <a:graphic>
-          <a:graphicData uri="http://schemas.openxmlformats.org/drawingml/2006/table">
-            <a:tbl>
-              <a:tblPr firstRow="1" bandRow="1">
-                <a:tableStyleId>{5C22544A-7EE6-4342-B048-85BDC9FD1C3A}</a:tableStyleId>
-              </a:tblPr>
-              <a:tblGrid>
-                <a:gridCol w="1133475"/>
-                <a:gridCol w="1133475"/>
-              </a:tblGrid>
-              <a:tr h="370840">
-                <a:tc>
-                  <a:txBody>
-                    <a:bodyPr/>
-                    <a:lstStyle/>
-                    <a:p>
-                      <a:pPr algn="ctr"/>
-                      <a:r>
-                        <a:rPr lang="en-CA" dirty="0" smtClean="0"/>
-                        <a:t>Size</a:t>
-                      </a:r>
-                      <a:endParaRPr lang="en-CA" dirty="0"/>
-                    </a:p>
-                  </a:txBody>
-                  <a:tcPr/>
-                </a:tc>
-                <a:tc>
-                  <a:txBody>
-                    <a:bodyPr/>
-                    <a:lstStyle/>
-                    <a:p>
-                      <a:pPr algn="ctr"/>
-                      <a:r>
-                        <a:rPr lang="en-CA" dirty="0" smtClean="0"/>
-                        <a:t>Weight</a:t>
-                      </a:r>
-                      <a:endParaRPr lang="en-CA" dirty="0"/>
-                    </a:p>
-                  </a:txBody>
-                  <a:tcPr/>
-                </a:tc>
-              </a:tr>
-              <a:tr h="370840">
-                <a:tc>
-                  <a:txBody>
-                    <a:bodyPr/>
-                    <a:lstStyle/>
-                    <a:p>
-                      <a:pPr algn="ctr"/>
-                      <a:r>
-                        <a:rPr lang="en-CA" dirty="0" err="1" smtClean="0"/>
-                        <a:t>Rect</a:t>
-                      </a:r>
-                      <a:endParaRPr lang="en-CA" dirty="0"/>
-                    </a:p>
-                  </a:txBody>
-                  <a:tcPr/>
-                </a:tc>
-                <a:tc>
-                  <a:txBody>
-                    <a:bodyPr/>
-                    <a:lstStyle/>
-                    <a:p>
-                      <a:pPr algn="ctr"/>
-                      <a:r>
-                        <a:rPr lang="en-CA" dirty="0" smtClean="0"/>
-                        <a:t>3.6</a:t>
-                      </a:r>
-                      <a:endParaRPr lang="en-CA" dirty="0"/>
-                    </a:p>
-                  </a:txBody>
-                  <a:tcPr/>
-                </a:tc>
-              </a:tr>
-              <a:tr h="370840">
-                <a:tc>
-                  <a:txBody>
-                    <a:bodyPr/>
-                    <a:lstStyle/>
-                    <a:p>
-                      <a:pPr algn="ctr"/>
-                      <a:r>
-                        <a:rPr lang="en-CA" dirty="0" smtClean="0"/>
-                        <a:t>Round</a:t>
-                      </a:r>
-                      <a:endParaRPr lang="en-CA" dirty="0"/>
-                    </a:p>
-                  </a:txBody>
-                  <a:tcPr/>
-                </a:tc>
-                <a:tc>
-                  <a:txBody>
-                    <a:bodyPr/>
-                    <a:lstStyle/>
-                    <a:p>
-                      <a:pPr algn="ctr"/>
-                      <a:r>
-                        <a:rPr lang="en-CA" dirty="0" smtClean="0"/>
-                        <a:t>4.25</a:t>
-                      </a:r>
-                      <a:endParaRPr lang="en-CA" dirty="0"/>
-                    </a:p>
-                  </a:txBody>
-                  <a:tcPr/>
-                </a:tc>
-              </a:tr>
-              <a:tr h="370840">
-                <a:tc>
-                  <a:txBody>
-                    <a:bodyPr/>
-                    <a:lstStyle/>
-                    <a:p>
-                      <a:pPr algn="ctr"/>
-                      <a:r>
-                        <a:rPr lang="en-CA" dirty="0" smtClean="0"/>
-                        <a:t>Round</a:t>
-                      </a:r>
-                      <a:endParaRPr lang="en-CA" dirty="0"/>
-                    </a:p>
-                  </a:txBody>
-                  <a:tcPr/>
-                </a:tc>
-                <a:tc>
-                  <a:txBody>
-                    <a:bodyPr/>
-                    <a:lstStyle/>
-                    <a:p>
-                      <a:pPr algn="ctr"/>
-                      <a:r>
-                        <a:rPr lang="en-CA" dirty="0" smtClean="0"/>
-                        <a:t>3.1</a:t>
-                      </a:r>
-                      <a:endParaRPr lang="en-CA" dirty="0"/>
-                    </a:p>
-                  </a:txBody>
-                  <a:tcPr/>
-                </a:tc>
-              </a:tr>
-            </a:tbl>
-          </a:graphicData>
-        </a:graphic>
-      </p:graphicFrame>
-      <p:sp>
-        <p:nvSpPr>
-          <p:cNvPr id="7" name="TextBox 6"/>
-          <p:cNvSpPr txBox="1"/>
-          <p:nvPr/>
-        </p:nvSpPr>
-        <p:spPr>
-          <a:xfrm>
-            <a:off x="5915025" y="3396734"/>
-            <a:ext cx="979755" cy="369332"/>
-          </a:xfrm>
-          <a:prstGeom prst="rect">
-            <a:avLst/>
-          </a:prstGeom>
-          <a:noFill/>
-        </p:spPr>
-        <p:txBody>
-          <a:bodyPr wrap="none" rtlCol="0">
-            <a:spAutoFit/>
-          </a:bodyPr>
-          <a:lstStyle/>
-          <a:p>
-            <a:r>
-              <a:rPr lang="en-CA" dirty="0" smtClean="0"/>
-              <a:t>weights</a:t>
-            </a:r>
-            <a:endParaRPr lang="en-CA" dirty="0"/>
-          </a:p>
-        </p:txBody>
-      </p:sp>
-    </p:spTree>
-    <p:extLst>
-      <p:ext uri="{BB962C8B-B14F-4D97-AF65-F5344CB8AC3E}">
-        <p14:creationId xmlns:p14="http://schemas.microsoft.com/office/powerpoint/2010/main" val="4205202404"/>
-      </p:ext>
-    </p:extLst>
-  </p:cSld>
-  <p:clrMapOvr>
-    <a:masterClrMapping/>
-  </p:clrMapOvr>
-  <p:timing>
-    <p:tnLst>
-      <p:par>
-        <p:cTn id="1" dur="indefinite" restart="never" nodeType="tmRoot"/>
-      </p:par>
-    </p:tnLst>
-  </p:timing>
-</p:sld>
-</file>
-
-<file path=ppt/slides/slide5.xml><?xml version="1.0" encoding="utf-8"?>
-<p:sld xmlns:a="http://schemas.openxmlformats.org/drawingml/2006/main" xmlns:r="http://schemas.openxmlformats.org/officeDocument/2006/relationships" xmlns:p="http://schemas.openxmlformats.org/presentationml/2006/main">
-  <p:cSld>
-    <p:spTree>
-      <p:nvGrpSpPr>
-        <p:cNvPr id="1" name=""/>
-        <p:cNvGrpSpPr/>
-        <p:nvPr/>
-      </p:nvGrpSpPr>
-      <p:grpSpPr>
-        <a:xfrm>
-          <a:off x="0" y="0"/>
-          <a:ext cx="0" cy="0"/>
-          <a:chOff x="0" y="0"/>
-          <a:chExt cx="0" cy="0"/>
-        </a:xfrm>
-      </p:grpSpPr>
-      <p:sp>
-        <p:nvSpPr>
-          <p:cNvPr id="2" name="Title 1"/>
-          <p:cNvSpPr>
-            <a:spLocks noGrp="1"/>
-          </p:cNvSpPr>
-          <p:nvPr>
-            <p:ph type="title"/>
-          </p:nvPr>
-        </p:nvSpPr>
-        <p:spPr>
-          <a:xfrm>
-            <a:off x="457200" y="449932"/>
-            <a:ext cx="8286750" cy="1150353"/>
-          </a:xfrm>
-        </p:spPr>
-        <p:txBody>
           <a:bodyPr/>
           <a:lstStyle/>
           <a:p>
@@ -9617,131 +8034,33 @@
         </p:spPr>
         <p:txBody>
           <a:bodyPr>
-            <a:normAutofit fontScale="92500" lnSpcReduction="20000"/>
+            <a:normAutofit/>
           </a:bodyPr>
           <a:lstStyle/>
           <a:p>
-            <a:r>
-              <a:rPr lang="en-CA" dirty="0">
-                <a:latin typeface="+mn-lt"/>
-              </a:rPr>
-              <a:t>Project </a:t>
-            </a:r>
             <a:r>
               <a:rPr lang="en-CA" dirty="0" smtClean="0">
                 <a:latin typeface="+mn-lt"/>
               </a:rPr>
-              <a:t>1 checkpoint due today</a:t>
+              <a:t>Project 1 due today!</a:t>
             </a:r>
           </a:p>
           <a:p>
             <a:pPr lvl="1"/>
-            <a:r>
-              <a:rPr lang="en-CA" dirty="0">
-                <a:latin typeface="+mn-lt"/>
-              </a:rPr>
-              <a:t>T</a:t>
-            </a:r>
             <a:r>
               <a:rPr lang="en-CA" dirty="0" smtClean="0">
                 <a:latin typeface="+mn-lt"/>
               </a:rPr>
-              <a:t>o </a:t>
-            </a:r>
-            <a:r>
-              <a:rPr lang="en-CA" dirty="0">
-                <a:latin typeface="+mn-lt"/>
-              </a:rPr>
-              <a:t>get full credit on the checkpoint, you must pass all public tests up to the checkpoint (that is, up to and including Part 1, Question 8</a:t>
-            </a:r>
-            <a:r>
-              <a:rPr lang="en-CA" dirty="0" smtClean="0">
-                <a:latin typeface="+mn-lt"/>
-              </a:rPr>
-              <a:t>)</a:t>
-            </a:r>
-          </a:p>
-          <a:p>
-            <a:pPr lvl="1"/>
-            <a:r>
-              <a:rPr lang="en-CA" dirty="0" smtClean="0">
-                <a:latin typeface="+mn-lt"/>
-              </a:rPr>
-              <a:t>You </a:t>
-            </a:r>
-            <a:r>
-              <a:rPr lang="en-CA" dirty="0">
-                <a:latin typeface="+mn-lt"/>
-              </a:rPr>
-              <a:t>can go back and change your answers before you submit next </a:t>
-            </a:r>
-            <a:r>
-              <a:rPr lang="en-CA" dirty="0" smtClean="0">
-                <a:latin typeface="+mn-lt"/>
-              </a:rPr>
-              <a:t>week</a:t>
-            </a:r>
-            <a:endParaRPr lang="en-CA" dirty="0">
-              <a:latin typeface="+mn-lt"/>
-            </a:endParaRPr>
-          </a:p>
-          <a:p>
-            <a:r>
-              <a:rPr lang="en-CA" dirty="0">
-                <a:latin typeface="+mn-lt"/>
-              </a:rPr>
-              <a:t>Project 1: the entire project is due next Friday </a:t>
-            </a:r>
-            <a:endParaRPr lang="en-CA" dirty="0" smtClean="0">
-              <a:latin typeface="+mn-lt"/>
-            </a:endParaRPr>
-          </a:p>
-          <a:p>
-            <a:pPr lvl="1"/>
-            <a:r>
-              <a:rPr lang="en-CA" dirty="0" smtClean="0">
-                <a:latin typeface="+mn-lt"/>
-              </a:rPr>
-              <a:t>Thursday </a:t>
-            </a:r>
-            <a:r>
-              <a:rPr lang="en-CA" dirty="0">
-                <a:latin typeface="+mn-lt"/>
-              </a:rPr>
-              <a:t>for a bonus </a:t>
-            </a:r>
-            <a:r>
-              <a:rPr lang="en-CA" dirty="0" smtClean="0">
-                <a:latin typeface="+mn-lt"/>
-              </a:rPr>
-              <a:t>point</a:t>
-            </a:r>
-            <a:endParaRPr lang="en-CA" dirty="0">
-              <a:latin typeface="+mn-lt"/>
-            </a:endParaRPr>
-          </a:p>
-          <a:p>
-            <a:pPr lvl="1"/>
-            <a:r>
-              <a:rPr lang="en-CA" dirty="0" smtClean="0">
-                <a:latin typeface="+mn-lt"/>
-              </a:rPr>
-              <a:t>If you're </a:t>
-            </a:r>
-            <a:r>
-              <a:rPr lang="en-CA" dirty="0">
-                <a:latin typeface="+mn-lt"/>
-              </a:rPr>
-              <a:t>working with a partner, only one person should submit, and make sure that you </a:t>
-            </a:r>
-            <a:r>
-              <a:rPr lang="en-CA" i="1" dirty="0">
+              <a:t>If you're working with a partner, only one person should submit, and make sure that you </a:t>
+            </a:r>
+            <a:r>
+              <a:rPr lang="en-CA" i="1" dirty="0" smtClean="0">
                 <a:latin typeface="+mn-lt"/>
               </a:rPr>
               <a:t>both</a:t>
             </a:r>
             <a:r>
-              <a:rPr lang="en-CA" dirty="0">
+              <a:rPr lang="en-CA" dirty="0" smtClean="0">
                 <a:latin typeface="+mn-lt"/>
               </a:rPr>
               <a:t> add each other as partners on </a:t>
@@ -9752,6 +8071,38 @@
               </a:rPr>
               <a:t>okpy</a:t>
             </a:r>
+            <a:endParaRPr lang="en-CA" dirty="0" smtClean="0">
+              <a:latin typeface="+mn-lt"/>
+            </a:endParaRPr>
+          </a:p>
+          <a:p>
+            <a:r>
+              <a:rPr lang="en-CA" dirty="0" smtClean="0">
+                <a:latin typeface="+mn-lt"/>
+              </a:rPr>
+              <a:t>Midterm is Friday 3/13 from 7-9PM</a:t>
+            </a:r>
+          </a:p>
+          <a:p>
+            <a:pPr lvl="1"/>
+            <a:r>
+              <a:rPr lang="en-CA" dirty="0" smtClean="0">
+                <a:latin typeface="+mn-lt"/>
+              </a:rPr>
+              <a:t>Fill </a:t>
+            </a:r>
+            <a:r>
+              <a:rPr lang="en-CA" dirty="0">
+                <a:latin typeface="+mn-lt"/>
+              </a:rPr>
+              <a:t>out conflict form by </a:t>
+            </a:r>
+            <a:r>
+              <a:rPr lang="en-CA" dirty="0" smtClean="0">
+                <a:latin typeface="+mn-lt"/>
+              </a:rPr>
+              <a:t>today if you have a conflict!</a:t>
+            </a:r>
             <a:endParaRPr lang="en-CA" dirty="0">
               <a:latin typeface="+mn-lt"/>
             </a:endParaRPr>
@@ -9761,21 +8112,25 @@
               <a:rPr lang="en-CA" dirty="0">
                 <a:latin typeface="+mn-lt"/>
               </a:rPr>
-              <a:t>HW3 and lab4 grades will be released today, and regrades are due Monday.</a:t>
-            </a:r>
-          </a:p>
-          <a:p>
+              <a:t>Midterm Review will be on </a:t>
+            </a:r>
+            <a:r>
+              <a:rPr lang="en-CA" dirty="0" smtClean="0">
+                <a:latin typeface="+mn-lt"/>
+              </a:rPr>
+              <a:t>03/11 from </a:t>
+            </a:r>
             <a:r>
               <a:rPr lang="en-CA" dirty="0">
                 <a:latin typeface="+mn-lt"/>
               </a:rPr>
-              <a:t>HW5 will be released today, and due next Thursday (Wednesday for a bonus point</a:t>
+              <a:t>6-8PM in 10 Evans &amp; 2050 </a:t>
             </a:r>
             <a:r>
               <a:rPr lang="en-CA" dirty="0" smtClean="0">
                 <a:latin typeface="+mn-lt"/>
               </a:rPr>
-              <a:t>)</a:t>
+              <a:t>VLSB</a:t>
             </a:r>
             <a:endParaRPr lang="en-CA" dirty="0">
               <a:latin typeface="+mn-lt"/>
@@ -9786,7 +8141,7 @@
     </p:spTree>
     <p:extLst>
       <p:ext uri="{BB962C8B-B14F-4D97-AF65-F5344CB8AC3E}">
-        <p14:creationId xmlns:p14="http://schemas.microsoft.com/office/powerpoint/2010/main" val="203414778"/>
+        <p14:creationId xmlns:p14="http://schemas.microsoft.com/office/powerpoint/2010/main" val="1098561969"/>
       </p:ext>
     </p:extLst>
   </p:cSld>

</xml_diff>